<commit_message>
Updated Data Cleanup/Engineering Slide
uploading updates to main
</commit_message>
<xml_diff>
--- a/Presentation/Group2 _Project2.pptx
+++ b/Presentation/Group2 _Project2.pptx
@@ -26371,8 +26371,38 @@
         </p:blipFill>
         <p:spPr>
           <a:xfrm>
-            <a:off x="965266" y="2028385"/>
-            <a:ext cx="7213467" cy="1823424"/>
+            <a:off x="0" y="2571750"/>
+            <a:ext cx="4440552" cy="1122485"/>
+          </a:xfrm>
+          <a:prstGeom prst="rect">
+            <a:avLst/>
+          </a:prstGeom>
+        </p:spPr>
+      </p:pic>
+      <p:pic>
+        <p:nvPicPr>
+          <p:cNvPr id="3" name="Picture 2" descr="A screenshot of a computer code&#10;&#10;Description automatically generated">
+            <a:extLst>
+              <a:ext uri="{FF2B5EF4-FFF2-40B4-BE49-F238E27FC236}">
+                <a16:creationId xmlns:a16="http://schemas.microsoft.com/office/drawing/2014/main" id="{25BA6FF5-1CDD-5461-AA7D-35DF4A147350}"/>
+              </a:ext>
+            </a:extLst>
+          </p:cNvPr>
+          <p:cNvPicPr>
+            <a:picLocks noChangeAspect="1"/>
+          </p:cNvPicPr>
+          <p:nvPr/>
+        </p:nvPicPr>
+        <p:blipFill>
+          <a:blip r:embed="rId4"/>
+          <a:stretch>
+            <a:fillRect/>
+          </a:stretch>
+        </p:blipFill>
+        <p:spPr>
+          <a:xfrm>
+            <a:off x="4354830" y="1502594"/>
+            <a:ext cx="4789170" cy="3021356"/>
           </a:xfrm>
           <a:prstGeom prst="rect">
             <a:avLst/>

</xml_diff>